<commit_message>
done with pso and bso
</commit_message>
<xml_diff>
--- a/DOCUMENTATION/final presentation .pptx
+++ b/DOCUMENTATION/final presentation .pptx
@@ -13,6 +13,10 @@
     <p:sldId id="262" r:id="rId7"/>
     <p:sldId id="259" r:id="rId8"/>
     <p:sldId id="261" r:id="rId9"/>
+    <p:sldId id="265" r:id="rId10"/>
+    <p:sldId id="267" r:id="rId11"/>
+    <p:sldId id="266" r:id="rId12"/>
+    <p:sldId id="268" r:id="rId13"/>
   </p:sldIdLst>
   <p:sldSz cx="12192000" cy="6858000"/>
   <p:notesSz cx="6858000" cy="9144000"/>
@@ -3432,6 +3436,322 @@
 </p:sld>
 </file>
 
+<file path=ppt/slides/slide10.xml><?xml version="1.0" encoding="utf-8"?>
+<p:sld xmlns:a="http://schemas.openxmlformats.org/drawingml/2006/main" xmlns:r="http://schemas.openxmlformats.org/officeDocument/2006/relationships" xmlns:p="http://schemas.openxmlformats.org/presentationml/2006/main">
+  <p:cSld>
+    <p:spTree>
+      <p:nvGrpSpPr>
+        <p:cNvPr id="1" name=""/>
+        <p:cNvGrpSpPr/>
+        <p:nvPr/>
+      </p:nvGrpSpPr>
+      <p:grpSpPr>
+        <a:xfrm>
+          <a:off x="0" y="0"/>
+          <a:ext cx="0" cy="0"/>
+          <a:chOff x="0" y="0"/>
+          <a:chExt cx="0" cy="0"/>
+        </a:xfrm>
+      </p:grpSpPr>
+      <p:sp>
+        <p:nvSpPr>
+          <p:cNvPr id="2" name="Title 1">
+            <a:extLst>
+              <a:ext uri="{FF2B5EF4-FFF2-40B4-BE49-F238E27FC236}">
+                <a16:creationId xmlns:a16="http://schemas.microsoft.com/office/drawing/2014/main" id="{007FEAD2-72CB-9905-3499-F8D347D1CEBC}"/>
+              </a:ext>
+            </a:extLst>
+          </p:cNvPr>
+          <p:cNvSpPr>
+            <a:spLocks noGrp="1"/>
+          </p:cNvSpPr>
+          <p:nvPr>
+            <p:ph type="title"/>
+          </p:nvPr>
+        </p:nvSpPr>
+        <p:spPr/>
+        <p:txBody>
+          <a:bodyPr/>
+          <a:lstStyle/>
+          <a:p>
+            <a:r>
+              <a:rPr lang="en-GH" dirty="0"/>
+              <a:t>Flow chat for ACO integration</a:t>
+            </a:r>
+          </a:p>
+        </p:txBody>
+      </p:sp>
+      <p:pic>
+        <p:nvPicPr>
+          <p:cNvPr id="5" name="Content Placeholder 4" descr="A diagram of a person's work flow&#10;&#10;AI-generated content may be incorrect.">
+            <a:extLst>
+              <a:ext uri="{FF2B5EF4-FFF2-40B4-BE49-F238E27FC236}">
+                <a16:creationId xmlns:a16="http://schemas.microsoft.com/office/drawing/2014/main" id="{73D8FFD4-5FFA-F6CE-2399-A719B7C07966}"/>
+              </a:ext>
+            </a:extLst>
+          </p:cNvPr>
+          <p:cNvPicPr>
+            <a:picLocks noGrp="1" noChangeAspect="1"/>
+          </p:cNvPicPr>
+          <p:nvPr>
+            <p:ph idx="1"/>
+          </p:nvPr>
+        </p:nvPicPr>
+        <p:blipFill>
+          <a:blip r:embed="rId2"/>
+          <a:stretch>
+            <a:fillRect/>
+          </a:stretch>
+        </p:blipFill>
+        <p:spPr>
+          <a:xfrm>
+            <a:off x="2562896" y="2445544"/>
+            <a:ext cx="6333454" cy="3111500"/>
+          </a:xfrm>
+        </p:spPr>
+      </p:pic>
+    </p:spTree>
+    <p:extLst>
+      <p:ext uri="{BB962C8B-B14F-4D97-AF65-F5344CB8AC3E}">
+        <p14:creationId xmlns:p14="http://schemas.microsoft.com/office/powerpoint/2010/main" val="556114706"/>
+      </p:ext>
+    </p:extLst>
+  </p:cSld>
+  <p:clrMapOvr>
+    <a:masterClrMapping/>
+  </p:clrMapOvr>
+</p:sld>
+</file>
+
+<file path=ppt/slides/slide11.xml><?xml version="1.0" encoding="utf-8"?>
+<p:sld xmlns:a="http://schemas.openxmlformats.org/drawingml/2006/main" xmlns:r="http://schemas.openxmlformats.org/officeDocument/2006/relationships" xmlns:p="http://schemas.openxmlformats.org/presentationml/2006/main">
+  <p:cSld>
+    <p:spTree>
+      <p:nvGrpSpPr>
+        <p:cNvPr id="1" name=""/>
+        <p:cNvGrpSpPr/>
+        <p:nvPr/>
+      </p:nvGrpSpPr>
+      <p:grpSpPr>
+        <a:xfrm>
+          <a:off x="0" y="0"/>
+          <a:ext cx="0" cy="0"/>
+          <a:chOff x="0" y="0"/>
+          <a:chExt cx="0" cy="0"/>
+        </a:xfrm>
+      </p:grpSpPr>
+      <p:sp>
+        <p:nvSpPr>
+          <p:cNvPr id="2" name="Title 1">
+            <a:extLst>
+              <a:ext uri="{FF2B5EF4-FFF2-40B4-BE49-F238E27FC236}">
+                <a16:creationId xmlns:a16="http://schemas.microsoft.com/office/drawing/2014/main" id="{1269F9EC-430E-26EA-9098-8A0D19E101A7}"/>
+              </a:ext>
+            </a:extLst>
+          </p:cNvPr>
+          <p:cNvSpPr>
+            <a:spLocks noGrp="1"/>
+          </p:cNvSpPr>
+          <p:nvPr>
+            <p:ph type="title"/>
+          </p:nvPr>
+        </p:nvSpPr>
+        <p:spPr/>
+        <p:txBody>
+          <a:bodyPr/>
+          <a:lstStyle/>
+          <a:p>
+            <a:r>
+              <a:rPr lang="en-GH" dirty="0"/>
+              <a:t>Why we can easily adap to this implementation.</a:t>
+            </a:r>
+          </a:p>
+        </p:txBody>
+      </p:sp>
+      <p:sp>
+        <p:nvSpPr>
+          <p:cNvPr id="3" name="Content Placeholder 2">
+            <a:extLst>
+              <a:ext uri="{FF2B5EF4-FFF2-40B4-BE49-F238E27FC236}">
+                <a16:creationId xmlns:a16="http://schemas.microsoft.com/office/drawing/2014/main" id="{B79979FD-D8FB-EEE1-0312-F2AB56EEEA1C}"/>
+              </a:ext>
+            </a:extLst>
+          </p:cNvPr>
+          <p:cNvSpPr>
+            <a:spLocks noGrp="1"/>
+          </p:cNvSpPr>
+          <p:nvPr>
+            <p:ph idx="1"/>
+          </p:nvPr>
+        </p:nvSpPr>
+        <p:spPr/>
+        <p:txBody>
+          <a:bodyPr>
+            <a:normAutofit/>
+          </a:bodyPr>
+          <a:lstStyle/>
+          <a:p>
+            <a:r>
+              <a:rPr lang="en-GB" dirty="0"/>
+              <a:t>Uses binary encoding — same as BEOA.</a:t>
+            </a:r>
+          </a:p>
+          <a:p>
+            <a:r>
+              <a:rPr lang="en-GB" dirty="0"/>
+              <a:t>Each ACO run is stateless — resets every generation. Thus Learns which features are useful without prior knowledge.</a:t>
+            </a:r>
+          </a:p>
+          <a:p>
+            <a:r>
+              <a:rPr lang="en-GB" dirty="0"/>
+              <a:t>Feature subset length is flexible — aligns with BEOA dynamics.</a:t>
+            </a:r>
+          </a:p>
+          <a:p>
+            <a:r>
+              <a:rPr lang="en-GB" dirty="0"/>
+              <a:t>Can serve as a local exploitation mechanism in BEOA.</a:t>
+            </a:r>
+          </a:p>
+          <a:p>
+            <a:r>
+              <a:rPr lang="en-GB" dirty="0"/>
+              <a:t>Easily plugged in as a refinement phase after mutation/crossover.</a:t>
+            </a:r>
+          </a:p>
+        </p:txBody>
+      </p:sp>
+    </p:spTree>
+    <p:extLst>
+      <p:ext uri="{BB962C8B-B14F-4D97-AF65-F5344CB8AC3E}">
+        <p14:creationId xmlns:p14="http://schemas.microsoft.com/office/powerpoint/2010/main" val="1289009003"/>
+      </p:ext>
+    </p:extLst>
+  </p:cSld>
+  <p:clrMapOvr>
+    <a:masterClrMapping/>
+  </p:clrMapOvr>
+</p:sld>
+</file>
+
+<file path=ppt/slides/slide12.xml><?xml version="1.0" encoding="utf-8"?>
+<p:sld xmlns:a="http://schemas.openxmlformats.org/drawingml/2006/main" xmlns:r="http://schemas.openxmlformats.org/officeDocument/2006/relationships" xmlns:p="http://schemas.openxmlformats.org/presentationml/2006/main">
+  <p:cSld>
+    <p:spTree>
+      <p:nvGrpSpPr>
+        <p:cNvPr id="1" name=""/>
+        <p:cNvGrpSpPr/>
+        <p:nvPr/>
+      </p:nvGrpSpPr>
+      <p:grpSpPr>
+        <a:xfrm>
+          <a:off x="0" y="0"/>
+          <a:ext cx="0" cy="0"/>
+          <a:chOff x="0" y="0"/>
+          <a:chExt cx="0" cy="0"/>
+        </a:xfrm>
+      </p:grpSpPr>
+      <p:sp>
+        <p:nvSpPr>
+          <p:cNvPr id="2" name="Title 1">
+            <a:extLst>
+              <a:ext uri="{FF2B5EF4-FFF2-40B4-BE49-F238E27FC236}">
+                <a16:creationId xmlns:a16="http://schemas.microsoft.com/office/drawing/2014/main" id="{BE7EBE73-43DE-04F0-41DB-DC98668D1537}"/>
+              </a:ext>
+            </a:extLst>
+          </p:cNvPr>
+          <p:cNvSpPr>
+            <a:spLocks noGrp="1"/>
+          </p:cNvSpPr>
+          <p:nvPr>
+            <p:ph type="title"/>
+          </p:nvPr>
+        </p:nvSpPr>
+        <p:spPr/>
+        <p:txBody>
+          <a:bodyPr/>
+          <a:lstStyle/>
+          <a:p>
+            <a:r>
+              <a:rPr lang="en-GH" dirty="0"/>
+              <a:t>Results </a:t>
+            </a:r>
+          </a:p>
+        </p:txBody>
+      </p:sp>
+      <p:pic>
+        <p:nvPicPr>
+          <p:cNvPr id="8" name="Content Placeholder 7" descr="A table with numbers and symbols&#10;&#10;AI-generated content may be incorrect.">
+            <a:extLst>
+              <a:ext uri="{FF2B5EF4-FFF2-40B4-BE49-F238E27FC236}">
+                <a16:creationId xmlns:a16="http://schemas.microsoft.com/office/drawing/2014/main" id="{DDCB3ACB-4FDA-B0E4-8A81-51E37F56F9E9}"/>
+              </a:ext>
+            </a:extLst>
+          </p:cNvPr>
+          <p:cNvPicPr>
+            <a:picLocks noGrp="1" noChangeAspect="1"/>
+          </p:cNvPicPr>
+          <p:nvPr>
+            <p:ph idx="1"/>
+          </p:nvPr>
+        </p:nvPicPr>
+        <p:blipFill>
+          <a:blip r:embed="rId2"/>
+          <a:stretch>
+            <a:fillRect/>
+          </a:stretch>
+        </p:blipFill>
+        <p:spPr>
+          <a:xfrm>
+            <a:off x="489397" y="1690687"/>
+            <a:ext cx="10650828" cy="1979791"/>
+          </a:xfrm>
+        </p:spPr>
+      </p:pic>
+      <p:pic>
+        <p:nvPicPr>
+          <p:cNvPr id="10" name="Picture 9" descr="A screenshot of a graph&#10;&#10;AI-generated content may be incorrect.">
+            <a:extLst>
+              <a:ext uri="{FF2B5EF4-FFF2-40B4-BE49-F238E27FC236}">
+                <a16:creationId xmlns:a16="http://schemas.microsoft.com/office/drawing/2014/main" id="{81B56BC0-1078-B5FB-3E20-69EBBD25D511}"/>
+              </a:ext>
+            </a:extLst>
+          </p:cNvPr>
+          <p:cNvPicPr>
+            <a:picLocks noChangeAspect="1"/>
+          </p:cNvPicPr>
+          <p:nvPr/>
+        </p:nvPicPr>
+        <p:blipFill>
+          <a:blip r:embed="rId3"/>
+          <a:stretch>
+            <a:fillRect/>
+          </a:stretch>
+        </p:blipFill>
+        <p:spPr>
+          <a:xfrm>
+            <a:off x="489397" y="3925886"/>
+            <a:ext cx="10650828" cy="1979792"/>
+          </a:xfrm>
+          <a:prstGeom prst="rect">
+            <a:avLst/>
+          </a:prstGeom>
+        </p:spPr>
+      </p:pic>
+    </p:spTree>
+    <p:extLst>
+      <p:ext uri="{BB962C8B-B14F-4D97-AF65-F5344CB8AC3E}">
+        <p14:creationId xmlns:p14="http://schemas.microsoft.com/office/powerpoint/2010/main" val="2835862732"/>
+      </p:ext>
+    </p:extLst>
+  </p:cSld>
+  <p:clrMapOvr>
+    <a:masterClrMapping/>
+  </p:clrMapOvr>
+</p:sld>
+</file>
+
 <file path=ppt/slides/slide2.xml><?xml version="1.0" encoding="utf-8"?>
 <p:sld xmlns:a="http://schemas.openxmlformats.org/drawingml/2006/main" xmlns:r="http://schemas.openxmlformats.org/officeDocument/2006/relationships" xmlns:p="http://schemas.openxmlformats.org/presentationml/2006/main">
   <p:cSld>
@@ -3495,7 +3815,9 @@
         </p:nvSpPr>
         <p:spPr/>
         <p:txBody>
-          <a:bodyPr/>
+          <a:bodyPr>
+            <a:normAutofit/>
+          </a:bodyPr>
           <a:lstStyle/>
           <a:p>
             <a:pPr marL="0" indent="0">
@@ -3549,6 +3871,12 @@
               <a:rPr lang="en-GH" dirty="0"/>
               <a:t>2. If we are all get infected we recover 50 percent of the entire population. To  enable exploration of more features in the compartmental model</a:t>
             </a:r>
+          </a:p>
+          <a:p>
+            <a:pPr marL="0" indent="0">
+              <a:buNone/>
+            </a:pPr>
+            <a:endParaRPr lang="en-GH" dirty="0"/>
           </a:p>
         </p:txBody>
       </p:sp>
@@ -3644,6 +3972,24 @@
           </a:p>
           <a:p>
             <a:r>
+              <a:rPr lang="en-GH" dirty="0"/>
+              <a:t>BSA</a:t>
+            </a:r>
+          </a:p>
+          <a:p>
+            <a:r>
+              <a:rPr lang="en-GH" dirty="0"/>
+              <a:t>FFA</a:t>
+            </a:r>
+          </a:p>
+          <a:p>
+            <a:r>
+              <a:rPr lang="en-GH" dirty="0"/>
+              <a:t>BGWO</a:t>
+            </a:r>
+          </a:p>
+          <a:p>
+            <a:r>
               <a:rPr lang="en-GH" b="1" dirty="0"/>
               <a:t>ACO</a:t>
             </a:r>
@@ -3652,18 +3998,6 @@
             <a:r>
               <a:rPr lang="en-GH" b="1" dirty="0"/>
               <a:t>BSO</a:t>
-            </a:r>
-          </a:p>
-          <a:p>
-            <a:r>
-              <a:rPr lang="en-GH" dirty="0"/>
-              <a:t>BSA</a:t>
-            </a:r>
-          </a:p>
-          <a:p>
-            <a:r>
-              <a:rPr lang="en-GH" dirty="0"/>
-              <a:t>FFA</a:t>
             </a:r>
           </a:p>
           <a:p>
@@ -3982,7 +4316,7 @@
             </a:pPr>
             <a:r>
               <a:rPr lang="en-GB" dirty="0"/>
-              <a:t>We employ the mechanisms used by this paper for calculating </a:t>
+              <a:t>We employ the mechanisms used by this research for calculating </a:t>
             </a:r>
           </a:p>
           <a:p>
@@ -4094,7 +4428,7 @@
           <a:p>
             <a:r>
               <a:rPr lang="en-GH" dirty="0"/>
-              <a:t>Why BSO</a:t>
+              <a:t>Why BSO </a:t>
             </a:r>
           </a:p>
         </p:txBody>
@@ -4412,12 +4746,72 @@
             <p:ph idx="1"/>
           </p:nvPr>
         </p:nvSpPr>
-        <p:spPr/>
-        <p:txBody>
-          <a:bodyPr/>
-          <a:lstStyle/>
-          <a:p>
-            <a:endParaRPr lang="en-GH"/>
+        <p:spPr>
+          <a:xfrm>
+            <a:off x="838200" y="1825625"/>
+            <a:ext cx="10515600" cy="4819874"/>
+          </a:xfrm>
+        </p:spPr>
+        <p:txBody>
+          <a:bodyPr>
+            <a:normAutofit fontScale="92500" lnSpcReduction="10000"/>
+          </a:bodyPr>
+          <a:lstStyle/>
+          <a:p>
+            <a:r>
+              <a:rPr lang="en-GB" b="1" dirty="0"/>
+              <a:t>Ant Colony Optimization (ACO)</a:t>
+            </a:r>
+            <a:r>
+              <a:rPr lang="en-GB" dirty="0"/>
+              <a:t> is a nature-inspired metaheuristic that mimics how real ants find the shortest path between their nest and food sources. Ants lay down a chemical called </a:t>
+            </a:r>
+            <a:r>
+              <a:rPr lang="en-GB" b="1" dirty="0"/>
+              <a:t>pheromone</a:t>
+            </a:r>
+            <a:r>
+              <a:rPr lang="en-GB" dirty="0"/>
+              <a:t>, and over time, paths with stronger pheromone attract more ants, reinforcing good solutions.</a:t>
+            </a:r>
+          </a:p>
+          <a:p>
+            <a:pPr marL="0" indent="0">
+              <a:buNone/>
+            </a:pPr>
+            <a:endParaRPr lang="en-GB" dirty="0"/>
+          </a:p>
+          <a:p>
+            <a:r>
+              <a:rPr lang="en-GB" dirty="0"/>
+              <a:t>ACO is widely used to solve </a:t>
+            </a:r>
+            <a:r>
+              <a:rPr lang="en-GB" b="1" dirty="0"/>
+              <a:t>combinatorial optimization problems</a:t>
+            </a:r>
+            <a:r>
+              <a:rPr lang="en-GB" dirty="0"/>
+              <a:t> like: Traveling Salesman Problem (TSP) , Scheduling , Routing , Feature Selection. </a:t>
+            </a:r>
+          </a:p>
+          <a:p>
+            <a:pPr marL="0" indent="0">
+              <a:buNone/>
+            </a:pPr>
+            <a:endParaRPr lang="en-GB" dirty="0"/>
+          </a:p>
+          <a:p>
+            <a:pPr marL="0" indent="0">
+              <a:buNone/>
+            </a:pPr>
+            <a:r>
+              <a:rPr lang="en-GB" dirty="0"/>
+              <a:t>Focusing on parameters like : Pheromone trail value, Importance of pheromone, Importance of heuristic information, Heuristic value, Pheromone evaporation rate  etc.</a:t>
+            </a:r>
+          </a:p>
+          <a:p>
+            <a:endParaRPr lang="en-GH" dirty="0"/>
           </a:p>
         </p:txBody>
       </p:sp>
@@ -4425,6 +4819,257 @@
     <p:extLst>
       <p:ext uri="{BB962C8B-B14F-4D97-AF65-F5344CB8AC3E}">
         <p14:creationId xmlns:p14="http://schemas.microsoft.com/office/powerpoint/2010/main" val="172699070"/>
+      </p:ext>
+    </p:extLst>
+  </p:cSld>
+  <p:clrMapOvr>
+    <a:masterClrMapping/>
+  </p:clrMapOvr>
+</p:sld>
+</file>
+
+<file path=ppt/slides/slide9.xml><?xml version="1.0" encoding="utf-8"?>
+<p:sld xmlns:a="http://schemas.openxmlformats.org/drawingml/2006/main" xmlns:r="http://schemas.openxmlformats.org/officeDocument/2006/relationships" xmlns:p="http://schemas.openxmlformats.org/presentationml/2006/main">
+  <p:cSld>
+    <p:spTree>
+      <p:nvGrpSpPr>
+        <p:cNvPr id="1" name=""/>
+        <p:cNvGrpSpPr/>
+        <p:nvPr/>
+      </p:nvGrpSpPr>
+      <p:grpSpPr>
+        <a:xfrm>
+          <a:off x="0" y="0"/>
+          <a:ext cx="0" cy="0"/>
+          <a:chOff x="0" y="0"/>
+          <a:chExt cx="0" cy="0"/>
+        </a:xfrm>
+      </p:grpSpPr>
+      <p:sp>
+        <p:nvSpPr>
+          <p:cNvPr id="2" name="Title 1">
+            <a:extLst>
+              <a:ext uri="{FF2B5EF4-FFF2-40B4-BE49-F238E27FC236}">
+                <a16:creationId xmlns:a16="http://schemas.microsoft.com/office/drawing/2014/main" id="{5FA47E8F-51AB-68B2-59AE-286BF7553A98}"/>
+              </a:ext>
+            </a:extLst>
+          </p:cNvPr>
+          <p:cNvSpPr>
+            <a:spLocks noGrp="1"/>
+          </p:cNvSpPr>
+          <p:nvPr>
+            <p:ph type="title"/>
+          </p:nvPr>
+        </p:nvSpPr>
+        <p:spPr>
+          <a:xfrm>
+            <a:off x="838200" y="154545"/>
+            <a:ext cx="10515600" cy="1536143"/>
+          </a:xfrm>
+        </p:spPr>
+        <p:txBody>
+          <a:bodyPr>
+            <a:normAutofit fontScale="90000"/>
+          </a:bodyPr>
+          <a:lstStyle/>
+          <a:p>
+            <a:br>
+              <a:rPr lang="en-GB" b="1" dirty="0"/>
+            </a:br>
+            <a:br>
+              <a:rPr lang="en-GB" b="1" dirty="0"/>
+            </a:br>
+            <a:r>
+              <a:rPr lang="en-GB" b="1" dirty="0"/>
+              <a:t>Research: Feature Selection for Classification Using an Ant Colony System , </a:t>
+            </a:r>
+            <a:br>
+              <a:rPr lang="en-GB" dirty="0"/>
+            </a:br>
+            <a:endParaRPr lang="en-GH" dirty="0"/>
+          </a:p>
+        </p:txBody>
+      </p:sp>
+      <p:sp>
+        <p:nvSpPr>
+          <p:cNvPr id="3" name="Content Placeholder 2">
+            <a:extLst>
+              <a:ext uri="{FF2B5EF4-FFF2-40B4-BE49-F238E27FC236}">
+                <a16:creationId xmlns:a16="http://schemas.microsoft.com/office/drawing/2014/main" id="{9F44161D-5622-32A9-A7C5-5BDC6CA46C22}"/>
+              </a:ext>
+            </a:extLst>
+          </p:cNvPr>
+          <p:cNvSpPr>
+            <a:spLocks noGrp="1"/>
+          </p:cNvSpPr>
+          <p:nvPr>
+            <p:ph idx="1"/>
+          </p:nvPr>
+        </p:nvSpPr>
+        <p:spPr/>
+        <p:txBody>
+          <a:bodyPr>
+            <a:normAutofit fontScale="55000" lnSpcReduction="20000"/>
+          </a:bodyPr>
+          <a:lstStyle/>
+          <a:p>
+            <a:r>
+              <a:rPr lang="en-GB" b="1" dirty="0"/>
+              <a:t>Authors: </a:t>
+            </a:r>
+            <a:r>
+              <a:rPr lang="en-GB" dirty="0"/>
+              <a:t>Nadia Abd-</a:t>
+            </a:r>
+            <a:r>
+              <a:rPr lang="en-GB" dirty="0" err="1"/>
+              <a:t>Alsabour</a:t>
+            </a:r>
+            <a:r>
+              <a:rPr lang="en-GB" dirty="0"/>
+              <a:t> &amp; Marcus Randall</a:t>
+            </a:r>
+            <a:br>
+              <a:rPr lang="en-GB" dirty="0"/>
+            </a:br>
+            <a:r>
+              <a:rPr lang="en-GB" dirty="0"/>
+              <a:t>School of Information Technology, Bond University, Australia</a:t>
+            </a:r>
+          </a:p>
+          <a:p>
+            <a:pPr marL="0" indent="0">
+              <a:buNone/>
+            </a:pPr>
+            <a:endParaRPr lang="en-GB" dirty="0"/>
+          </a:p>
+          <a:p>
+            <a:r>
+              <a:rPr lang="en-GB" b="1" dirty="0"/>
+              <a:t>Key Contributions of the Paper:</a:t>
+            </a:r>
+          </a:p>
+          <a:p>
+            <a:r>
+              <a:rPr lang="en-GB" dirty="0"/>
+              <a:t>Proposed a </a:t>
+            </a:r>
+            <a:r>
+              <a:rPr lang="en-GB" b="1" dirty="0"/>
+              <a:t>Binary ACO variant</a:t>
+            </a:r>
+            <a:r>
+              <a:rPr lang="en-GB" dirty="0"/>
+              <a:t> tailored for feature selection.</a:t>
+            </a:r>
+          </a:p>
+          <a:p>
+            <a:r>
+              <a:rPr lang="en-GB" b="1" dirty="0"/>
+              <a:t>No construction graph</a:t>
+            </a:r>
+            <a:r>
+              <a:rPr lang="en-GB" dirty="0"/>
+              <a:t> — instead used binary vectors (1 = select, 0 = skip).</a:t>
+            </a:r>
+          </a:p>
+          <a:p>
+            <a:r>
+              <a:rPr lang="en-GB" b="1" dirty="0"/>
+              <a:t>New move probability rule</a:t>
+            </a:r>
+            <a:endParaRPr lang="en-GB" dirty="0"/>
+          </a:p>
+          <a:p>
+            <a:r>
+              <a:rPr lang="en-GB" dirty="0"/>
+              <a:t>Used both:</a:t>
+            </a:r>
+          </a:p>
+          <a:p>
+            <a:pPr lvl="1"/>
+            <a:r>
+              <a:rPr lang="en-GB" b="1" dirty="0"/>
+              <a:t>Local pheromone update</a:t>
+            </a:r>
+            <a:r>
+              <a:rPr lang="en-GB" dirty="0"/>
+              <a:t> (exploration)</a:t>
+            </a:r>
+          </a:p>
+          <a:p>
+            <a:pPr lvl="1"/>
+            <a:r>
+              <a:rPr lang="en-GB" b="1" dirty="0"/>
+              <a:t>Global update by best ant</a:t>
+            </a:r>
+            <a:r>
+              <a:rPr lang="en-GB" dirty="0"/>
+              <a:t> (exploitation)</a:t>
+            </a:r>
+          </a:p>
+          <a:p>
+            <a:r>
+              <a:rPr lang="en-GB" dirty="0"/>
+              <a:t>Wrapper-based approach using </a:t>
+            </a:r>
+            <a:r>
+              <a:rPr lang="en-GB" b="1" dirty="0"/>
+              <a:t>SVM accuracy</a:t>
+            </a:r>
+            <a:r>
+              <a:rPr lang="en-GB" dirty="0"/>
+              <a:t> as the fitness function.</a:t>
+            </a:r>
+          </a:p>
+          <a:p>
+            <a:pPr marL="0" indent="0">
+              <a:buNone/>
+            </a:pPr>
+            <a:endParaRPr lang="en-GB" dirty="0"/>
+          </a:p>
+          <a:p>
+            <a:r>
+              <a:rPr lang="en-GB" dirty="0"/>
+              <a:t>Tested on 10 datasets (UCI + statistical) and </a:t>
+            </a:r>
+            <a:r>
+              <a:rPr lang="en-GB" b="1" dirty="0"/>
+              <a:t>outperformed traditional methods</a:t>
+            </a:r>
+            <a:r>
+              <a:rPr lang="en-GB" dirty="0"/>
+              <a:t> like GA, PSO, and CBPSO in accuracy.</a:t>
+            </a:r>
+          </a:p>
+          <a:p>
+            <a:pPr marL="0" indent="0">
+              <a:buNone/>
+            </a:pPr>
+            <a:endParaRPr lang="en-GB" dirty="0"/>
+          </a:p>
+          <a:p>
+            <a:r>
+              <a:rPr lang="en-GB" b="1" dirty="0"/>
+              <a:t>Published in:   </a:t>
+            </a:r>
+            <a:r>
+              <a:rPr lang="en-GB" dirty="0"/>
+              <a:t>6th IEEE International Conference on e-Science Workshops, 2010</a:t>
+            </a:r>
+          </a:p>
+          <a:p>
+            <a:pPr marL="0" indent="0">
+              <a:buNone/>
+            </a:pPr>
+            <a:endParaRPr lang="en-GH" dirty="0"/>
+          </a:p>
+        </p:txBody>
+      </p:sp>
+    </p:spTree>
+    <p:extLst>
+      <p:ext uri="{BB962C8B-B14F-4D97-AF65-F5344CB8AC3E}">
+        <p14:creationId xmlns:p14="http://schemas.microsoft.com/office/powerpoint/2010/main" val="1327635558"/>
       </p:ext>
     </p:extLst>
   </p:cSld>

</xml_diff>